<commit_message>
Quellenangabe für Bild ergänzt
</commit_message>
<xml_diff>
--- a/presentation/Versionskontrolle.pptx
+++ b/presentation/Versionskontrolle.pptx
@@ -1149,6 +1149,16 @@
               <a:rPr lang="de-DE" dirty="0"/>
               <a:t>https://pixabay.com/de/photos/portr%C3%A4t-mann-m%C3%A4nnlich-person-2194457/</a:t>
             </a:r>
+          </a:p>
+          <a:p>
+            <a:pPr marL="0" indent="0">
+              <a:buNone/>
+            </a:pPr>
+            <a:r>
+              <a:rPr lang="de-DE"/>
+              <a:t>https://pixabay.com/de/photos/apple-smartphone-schreibtisch-1282241/</a:t>
+            </a:r>
+            <a:endParaRPr lang="de-DE" dirty="0"/>
           </a:p>
         </p:txBody>
       </p:sp>

</xml_diff>

<commit_message>
Versionskontrolle: Fehler in Zusammenfassung korrigiert.
</commit_message>
<xml_diff>
--- a/presentation/Versionskontrolle.pptx
+++ b/presentation/Versionskontrolle.pptx
@@ -7117,8 +7117,12 @@
           <a:p>
             <a:pPr lvl="1"/>
             <a:r>
+              <a:rPr lang="de-DE"/>
+              <a:t>gemeinsamer</a:t>
+            </a:r>
+            <a:r>
               <a:rPr lang="de-DE" dirty="0"/>
-              <a:t>gemeinsamer Zugriff / Datenaustausch</a:t>
+              <a:t>/zeitgleicher Zugriff</a:t>
             </a:r>
           </a:p>
           <a:p>

</xml_diff>